<commit_message>
Exemplo criando um router v6
</commit_message>
<xml_diff>
--- a/prova-SENAC/Prova SENAC.pptx
+++ b/prova-SENAC/Prova SENAC.pptx
@@ -23,7 +23,8 @@
     <p:sldId id="274" r:id="rId17"/>
     <p:sldId id="275" r:id="rId18"/>
     <p:sldId id="276" r:id="rId19"/>
-    <p:sldId id="277" r:id="rId20"/>
+    <p:sldId id="278" r:id="rId20"/>
+    <p:sldId id="277" r:id="rId21"/>
   </p:sldIdLst>
   <p:sldSz cx="12192000" cy="6858000"/>
   <p:notesSz cx="6858000" cy="9144000"/>
@@ -135,7 +136,7 @@
   <pc:docChgLst>
     <pc:chgData name="RODOLFo BORTOLUZZI" userId="2f9df13b7ffa4ad2" providerId="LiveId" clId="{75BC9DE6-5F88-4036-8005-74699978EB56}"/>
     <pc:docChg chg="undo custSel addSld modSld">
-      <pc:chgData name="RODOLFo BORTOLUZZI" userId="2f9df13b7ffa4ad2" providerId="LiveId" clId="{75BC9DE6-5F88-4036-8005-74699978EB56}" dt="2023-08-19T01:02:22.094" v="86" actId="20577"/>
+      <pc:chgData name="RODOLFo BORTOLUZZI" userId="2f9df13b7ffa4ad2" providerId="LiveId" clId="{75BC9DE6-5F88-4036-8005-74699978EB56}" dt="2023-08-19T12:06:48.824" v="108" actId="20577"/>
       <pc:docMkLst>
         <pc:docMk/>
       </pc:docMkLst>
@@ -159,6 +160,29 @@
             <pc:docMk/>
             <pc:sldMk cId="695854263" sldId="277"/>
             <ac:spMk id="3" creationId="{F84B15DE-7C63-A055-5E4A-2BE74259B779}"/>
+          </ac:spMkLst>
+        </pc:spChg>
+      </pc:sldChg>
+      <pc:sldChg chg="modSp new mod">
+        <pc:chgData name="RODOLFo BORTOLUZZI" userId="2f9df13b7ffa4ad2" providerId="LiveId" clId="{75BC9DE6-5F88-4036-8005-74699978EB56}" dt="2023-08-19T12:06:48.824" v="108" actId="20577"/>
+        <pc:sldMkLst>
+          <pc:docMk/>
+          <pc:sldMk cId="400594949" sldId="278"/>
+        </pc:sldMkLst>
+        <pc:spChg chg="mod">
+          <ac:chgData name="RODOLFo BORTOLUZZI" userId="2f9df13b7ffa4ad2" providerId="LiveId" clId="{75BC9DE6-5F88-4036-8005-74699978EB56}" dt="2023-08-19T12:06:21.039" v="104" actId="20577"/>
+          <ac:spMkLst>
+            <pc:docMk/>
+            <pc:sldMk cId="400594949" sldId="278"/>
+            <ac:spMk id="2" creationId="{950734AA-D7A8-9B8A-F1F2-91DCC667B256}"/>
+          </ac:spMkLst>
+        </pc:spChg>
+        <pc:spChg chg="mod">
+          <ac:chgData name="RODOLFo BORTOLUZZI" userId="2f9df13b7ffa4ad2" providerId="LiveId" clId="{75BC9DE6-5F88-4036-8005-74699978EB56}" dt="2023-08-19T12:06:48.824" v="108" actId="20577"/>
+          <ac:spMkLst>
+            <pc:docMk/>
+            <pc:sldMk cId="400594949" sldId="278"/>
+            <ac:spMk id="3" creationId="{E5402909-CD9D-5705-FDDB-76E829601A3F}"/>
           </ac:spMkLst>
         </pc:spChg>
       </pc:sldChg>
@@ -314,7 +338,7 @@
           <a:p>
             <a:fld id="{C1691109-F4F8-4597-962C-A4F4B7960636}" type="datetimeFigureOut">
               <a:rPr lang="en-US" smtClean="0"/>
-              <a:t>8/18/2023</a:t>
+              <a:t>8/19/2023</a:t>
             </a:fld>
             <a:endParaRPr lang="en-US"/>
           </a:p>
@@ -512,7 +536,7 @@
           <a:p>
             <a:fld id="{C1691109-F4F8-4597-962C-A4F4B7960636}" type="datetimeFigureOut">
               <a:rPr lang="en-US" smtClean="0"/>
-              <a:t>8/18/2023</a:t>
+              <a:t>8/19/2023</a:t>
             </a:fld>
             <a:endParaRPr lang="en-US"/>
           </a:p>
@@ -720,7 +744,7 @@
           <a:p>
             <a:fld id="{C1691109-F4F8-4597-962C-A4F4B7960636}" type="datetimeFigureOut">
               <a:rPr lang="en-US" smtClean="0"/>
-              <a:t>8/18/2023</a:t>
+              <a:t>8/19/2023</a:t>
             </a:fld>
             <a:endParaRPr lang="en-US"/>
           </a:p>
@@ -918,7 +942,7 @@
           <a:p>
             <a:fld id="{C1691109-F4F8-4597-962C-A4F4B7960636}" type="datetimeFigureOut">
               <a:rPr lang="en-US" smtClean="0"/>
-              <a:t>8/18/2023</a:t>
+              <a:t>8/19/2023</a:t>
             </a:fld>
             <a:endParaRPr lang="en-US"/>
           </a:p>
@@ -1193,7 +1217,7 @@
           <a:p>
             <a:fld id="{C1691109-F4F8-4597-962C-A4F4B7960636}" type="datetimeFigureOut">
               <a:rPr lang="en-US" smtClean="0"/>
-              <a:t>8/18/2023</a:t>
+              <a:t>8/19/2023</a:t>
             </a:fld>
             <a:endParaRPr lang="en-US"/>
           </a:p>
@@ -1458,7 +1482,7 @@
           <a:p>
             <a:fld id="{C1691109-F4F8-4597-962C-A4F4B7960636}" type="datetimeFigureOut">
               <a:rPr lang="en-US" smtClean="0"/>
-              <a:t>8/18/2023</a:t>
+              <a:t>8/19/2023</a:t>
             </a:fld>
             <a:endParaRPr lang="en-US"/>
           </a:p>
@@ -1870,7 +1894,7 @@
           <a:p>
             <a:fld id="{C1691109-F4F8-4597-962C-A4F4B7960636}" type="datetimeFigureOut">
               <a:rPr lang="en-US" smtClean="0"/>
-              <a:t>8/18/2023</a:t>
+              <a:t>8/19/2023</a:t>
             </a:fld>
             <a:endParaRPr lang="en-US"/>
           </a:p>
@@ -2011,7 +2035,7 @@
           <a:p>
             <a:fld id="{C1691109-F4F8-4597-962C-A4F4B7960636}" type="datetimeFigureOut">
               <a:rPr lang="en-US" smtClean="0"/>
-              <a:t>8/18/2023</a:t>
+              <a:t>8/19/2023</a:t>
             </a:fld>
             <a:endParaRPr lang="en-US"/>
           </a:p>
@@ -2124,7 +2148,7 @@
           <a:p>
             <a:fld id="{C1691109-F4F8-4597-962C-A4F4B7960636}" type="datetimeFigureOut">
               <a:rPr lang="en-US" smtClean="0"/>
-              <a:t>8/18/2023</a:t>
+              <a:t>8/19/2023</a:t>
             </a:fld>
             <a:endParaRPr lang="en-US"/>
           </a:p>
@@ -2435,7 +2459,7 @@
           <a:p>
             <a:fld id="{C1691109-F4F8-4597-962C-A4F4B7960636}" type="datetimeFigureOut">
               <a:rPr lang="en-US" smtClean="0"/>
-              <a:t>8/18/2023</a:t>
+              <a:t>8/19/2023</a:t>
             </a:fld>
             <a:endParaRPr lang="en-US"/>
           </a:p>
@@ -2723,7 +2747,7 @@
           <a:p>
             <a:fld id="{C1691109-F4F8-4597-962C-A4F4B7960636}" type="datetimeFigureOut">
               <a:rPr lang="en-US" smtClean="0"/>
-              <a:t>8/18/2023</a:t>
+              <a:t>8/19/2023</a:t>
             </a:fld>
             <a:endParaRPr lang="en-US"/>
           </a:p>
@@ -2964,7 +2988,7 @@
           <a:p>
             <a:fld id="{C1691109-F4F8-4597-962C-A4F4B7960636}" type="datetimeFigureOut">
               <a:rPr lang="en-US" smtClean="0"/>
-              <a:t>8/18/2023</a:t>
+              <a:t>8/19/2023</a:t>
             </a:fld>
             <a:endParaRPr lang="en-US"/>
           </a:p>
@@ -5150,7 +5174,7 @@
           <p:cNvPr id="2" name="Título 1">
             <a:extLst>
               <a:ext uri="{FF2B5EF4-FFF2-40B4-BE49-F238E27FC236}">
-                <a16:creationId xmlns:a16="http://schemas.microsoft.com/office/drawing/2014/main" id="{7A5C408B-4911-0127-0C5F-FABDACE3E540}"/>
+                <a16:creationId xmlns:a16="http://schemas.microsoft.com/office/drawing/2014/main" id="{950734AA-D7A8-9B8A-F1F2-91DCC667B256}"/>
               </a:ext>
             </a:extLst>
           </p:cNvPr>
@@ -5167,49 +5191,8 @@
           <a:lstStyle/>
           <a:p>
             <a:r>
-              <a:rPr lang="pt-BR" dirty="0"/>
-              <a:t>Implementando um </a:t>
-            </a:r>
-            <a:r>
               <a:rPr lang="pt-BR" dirty="0" err="1"/>
-              <a:t>router</a:t>
-            </a:r>
-            <a:r>
-              <a:rPr lang="pt-BR" dirty="0"/>
-              <a:t> no </a:t>
-            </a:r>
-            <a:r>
-              <a:rPr lang="pt-BR" dirty="0" err="1"/>
-              <a:t>react</a:t>
-            </a:r>
-            <a:endParaRPr lang="pt-BR" dirty="0"/>
-          </a:p>
-        </p:txBody>
-      </p:sp>
-      <p:sp>
-        <p:nvSpPr>
-          <p:cNvPr id="3" name="Espaço Reservado para Conteúdo 2">
-            <a:extLst>
-              <a:ext uri="{FF2B5EF4-FFF2-40B4-BE49-F238E27FC236}">
-                <a16:creationId xmlns:a16="http://schemas.microsoft.com/office/drawing/2014/main" id="{F84B15DE-7C63-A055-5E4A-2BE74259B779}"/>
-              </a:ext>
-            </a:extLst>
-          </p:cNvPr>
-          <p:cNvSpPr>
-            <a:spLocks noGrp="1"/>
-          </p:cNvSpPr>
-          <p:nvPr>
-            <p:ph idx="1"/>
-          </p:nvPr>
-        </p:nvSpPr>
-        <p:spPr/>
-        <p:txBody>
-          <a:bodyPr/>
-          <a:lstStyle/>
-          <a:p>
-            <a:r>
-              <a:rPr lang="pt-BR" dirty="0" err="1"/>
-              <a:t>npm</a:t>
+              <a:t>React</a:t>
             </a:r>
             <a:r>
               <a:rPr lang="pt-BR" dirty="0"/>
@@ -5217,7 +5200,45 @@
             </a:r>
             <a:r>
               <a:rPr lang="pt-BR" dirty="0" err="1"/>
-              <a:t>install</a:t>
+              <a:t>Router</a:t>
+            </a:r>
+            <a:r>
+              <a:rPr lang="pt-BR" dirty="0"/>
+              <a:t> Dom	</a:t>
+            </a:r>
+          </a:p>
+        </p:txBody>
+      </p:sp>
+      <p:sp>
+        <p:nvSpPr>
+          <p:cNvPr id="3" name="Espaço Reservado para Conteúdo 2">
+            <a:extLst>
+              <a:ext uri="{FF2B5EF4-FFF2-40B4-BE49-F238E27FC236}">
+                <a16:creationId xmlns:a16="http://schemas.microsoft.com/office/drawing/2014/main" id="{E5402909-CD9D-5705-FDDB-76E829601A3F}"/>
+              </a:ext>
+            </a:extLst>
+          </p:cNvPr>
+          <p:cNvSpPr>
+            <a:spLocks noGrp="1"/>
+          </p:cNvSpPr>
+          <p:nvPr>
+            <p:ph idx="1"/>
+          </p:nvPr>
+        </p:nvSpPr>
+        <p:spPr/>
+        <p:txBody>
+          <a:bodyPr>
+            <a:normAutofit fontScale="77500" lnSpcReduction="20000"/>
+          </a:bodyPr>
+          <a:lstStyle/>
+          <a:p>
+            <a:r>
+              <a:rPr lang="pt-BR" dirty="0"/>
+              <a:t>Por que usar o </a:t>
+            </a:r>
+            <a:r>
+              <a:rPr lang="pt-BR" dirty="0" err="1"/>
+              <a:t>React</a:t>
             </a:r>
             <a:r>
               <a:rPr lang="pt-BR" dirty="0"/>
@@ -5225,28 +5246,130 @@
             </a:r>
             <a:r>
               <a:rPr lang="pt-BR" dirty="0" err="1"/>
-              <a:t>react</a:t>
+              <a:t>Router</a:t>
             </a:r>
             <a:r>
               <a:rPr lang="pt-BR" dirty="0"/>
-              <a:t>-</a:t>
+              <a:t> para roteamento?</a:t>
+            </a:r>
+          </a:p>
+          <a:p>
+            <a:r>
+              <a:rPr lang="pt-BR" dirty="0"/>
+              <a:t>Os aplicativos da Web tradicionais de várias páginas geralmente têm vários arquivos de exibição (páginas) para renderizar diferentes exibições, mas os </a:t>
             </a:r>
             <a:r>
               <a:rPr lang="pt-BR" dirty="0" err="1"/>
-              <a:t>router</a:t>
+              <a:t>SPAs</a:t>
+            </a:r>
+            <a:r>
+              <a:rPr lang="pt-BR" dirty="0"/>
+              <a:t> modernos usam exibições baseadas em componentes. Portanto, você precisa alternar os componentes com base na URL por meio do conceito de roteamento. Cada </a:t>
             </a:r>
             <a:r>
               <a:rPr lang="pt-BR"/>
-              <a:t>-dom @types/react-router-dom</a:t>
-            </a:r>
+              <a:t>requisito de desenvolvimento </a:t>
+            </a:r>
+            <a:r>
+              <a:rPr lang="pt-BR" dirty="0"/>
+              <a:t>que ocorre no desenvolvimento de aplicativos </a:t>
+            </a:r>
+            <a:r>
+              <a:rPr lang="pt-BR" dirty="0" err="1"/>
+              <a:t>React</a:t>
+            </a:r>
+            <a:r>
+              <a:rPr lang="pt-BR" dirty="0"/>
+              <a:t> não precisa de uma biblioteca de terceiros. Ainda assim, os requisitos de roteamento são, sem dúvida, complexos e precisam de uma biblioteca </a:t>
+            </a:r>
+            <a:r>
+              <a:rPr lang="pt-BR" dirty="0" err="1"/>
+              <a:t>pré</a:t>
+            </a:r>
+            <a:r>
+              <a:rPr lang="pt-BR" dirty="0"/>
+              <a:t>-desenvolvida para criar aplicativos de forma produtiva.</a:t>
+            </a:r>
+          </a:p>
+          <a:p>
             <a:endParaRPr lang="pt-BR" dirty="0"/>
+          </a:p>
+          <a:p>
+            <a:r>
+              <a:rPr lang="pt-BR" dirty="0"/>
+              <a:t>O </a:t>
+            </a:r>
+            <a:r>
+              <a:rPr lang="pt-BR" dirty="0" err="1"/>
+              <a:t>React</a:t>
+            </a:r>
+            <a:r>
+              <a:rPr lang="pt-BR" dirty="0"/>
+              <a:t> </a:t>
+            </a:r>
+            <a:r>
+              <a:rPr lang="pt-BR" dirty="0" err="1"/>
+              <a:t>Router</a:t>
+            </a:r>
+            <a:r>
+              <a:rPr lang="pt-BR" dirty="0"/>
+              <a:t> é a biblioteca de roteamento mais popular e com todos os recursos para </a:t>
+            </a:r>
+            <a:r>
+              <a:rPr lang="pt-BR" dirty="0" err="1"/>
+              <a:t>SPAs</a:t>
+            </a:r>
+            <a:r>
+              <a:rPr lang="pt-BR" dirty="0"/>
+              <a:t> baseados em </a:t>
+            </a:r>
+            <a:r>
+              <a:rPr lang="pt-BR" dirty="0" err="1"/>
+              <a:t>React</a:t>
+            </a:r>
+            <a:r>
+              <a:rPr lang="pt-BR" dirty="0"/>
+              <a:t>. Ele vem com tamanho leve, API fácil de aprender e documentação bem escrita para que todo desenvolvedor </a:t>
+            </a:r>
+            <a:r>
+              <a:rPr lang="pt-BR" dirty="0" err="1"/>
+              <a:t>React</a:t>
+            </a:r>
+            <a:r>
+              <a:rPr lang="pt-BR" dirty="0"/>
+              <a:t> possa implementar o roteamento de forma produtiva em qualquer aplicativo </a:t>
+            </a:r>
+            <a:r>
+              <a:rPr lang="pt-BR" dirty="0" err="1"/>
+              <a:t>React</a:t>
+            </a:r>
+            <a:r>
+              <a:rPr lang="pt-BR" dirty="0"/>
+              <a:t>. Além disso, o </a:t>
+            </a:r>
+            <a:r>
+              <a:rPr lang="pt-BR" dirty="0" err="1"/>
+              <a:t>React</a:t>
+            </a:r>
+            <a:r>
+              <a:rPr lang="pt-BR" dirty="0"/>
+              <a:t> </a:t>
+            </a:r>
+            <a:r>
+              <a:rPr lang="pt-BR" dirty="0" err="1"/>
+              <a:t>Router</a:t>
+            </a:r>
+            <a:r>
+              <a:rPr lang="pt-BR" dirty="0"/>
+              <a:t> agora é um projeto mantido pelo Remix com desenvolvimento ativo e suporte ao desenvolvedor.</a:t>
+            </a:r>
           </a:p>
         </p:txBody>
       </p:sp>
     </p:spTree>
     <p:extLst>
       <p:ext uri="{BB962C8B-B14F-4D97-AF65-F5344CB8AC3E}">
-        <p14:creationId xmlns:p14="http://schemas.microsoft.com/office/powerpoint/2010/main" val="695854263"/>
+        <p14:creationId xmlns:p14="http://schemas.microsoft.com/office/powerpoint/2010/main" val="400594949"/>
       </p:ext>
     </p:extLst>
   </p:cSld>
@@ -5854,6 +5977,134 @@
     <p:extLst>
       <p:ext uri="{BB962C8B-B14F-4D97-AF65-F5344CB8AC3E}">
         <p14:creationId xmlns:p14="http://schemas.microsoft.com/office/powerpoint/2010/main" val="3570182246"/>
+      </p:ext>
+    </p:extLst>
+  </p:cSld>
+  <p:clrMapOvr>
+    <a:masterClrMapping/>
+  </p:clrMapOvr>
+</p:sld>
+</file>
+
+<file path=ppt/slides/slide20.xml><?xml version="1.0" encoding="utf-8"?>
+<p:sld xmlns:a="http://schemas.openxmlformats.org/drawingml/2006/main" xmlns:r="http://schemas.openxmlformats.org/officeDocument/2006/relationships" xmlns:p="http://schemas.openxmlformats.org/presentationml/2006/main">
+  <p:cSld>
+    <p:spTree>
+      <p:nvGrpSpPr>
+        <p:cNvPr id="1" name=""/>
+        <p:cNvGrpSpPr/>
+        <p:nvPr/>
+      </p:nvGrpSpPr>
+      <p:grpSpPr>
+        <a:xfrm>
+          <a:off x="0" y="0"/>
+          <a:ext cx="0" cy="0"/>
+          <a:chOff x="0" y="0"/>
+          <a:chExt cx="0" cy="0"/>
+        </a:xfrm>
+      </p:grpSpPr>
+      <p:sp>
+        <p:nvSpPr>
+          <p:cNvPr id="2" name="Título 1">
+            <a:extLst>
+              <a:ext uri="{FF2B5EF4-FFF2-40B4-BE49-F238E27FC236}">
+                <a16:creationId xmlns:a16="http://schemas.microsoft.com/office/drawing/2014/main" id="{7A5C408B-4911-0127-0C5F-FABDACE3E540}"/>
+              </a:ext>
+            </a:extLst>
+          </p:cNvPr>
+          <p:cNvSpPr>
+            <a:spLocks noGrp="1"/>
+          </p:cNvSpPr>
+          <p:nvPr>
+            <p:ph type="title"/>
+          </p:nvPr>
+        </p:nvSpPr>
+        <p:spPr/>
+        <p:txBody>
+          <a:bodyPr/>
+          <a:lstStyle/>
+          <a:p>
+            <a:r>
+              <a:rPr lang="pt-BR" dirty="0"/>
+              <a:t>Implementando um </a:t>
+            </a:r>
+            <a:r>
+              <a:rPr lang="pt-BR" dirty="0" err="1"/>
+              <a:t>router</a:t>
+            </a:r>
+            <a:r>
+              <a:rPr lang="pt-BR" dirty="0"/>
+              <a:t> no </a:t>
+            </a:r>
+            <a:r>
+              <a:rPr lang="pt-BR" dirty="0" err="1"/>
+              <a:t>react</a:t>
+            </a:r>
+            <a:endParaRPr lang="pt-BR" dirty="0"/>
+          </a:p>
+        </p:txBody>
+      </p:sp>
+      <p:sp>
+        <p:nvSpPr>
+          <p:cNvPr id="3" name="Espaço Reservado para Conteúdo 2">
+            <a:extLst>
+              <a:ext uri="{FF2B5EF4-FFF2-40B4-BE49-F238E27FC236}">
+                <a16:creationId xmlns:a16="http://schemas.microsoft.com/office/drawing/2014/main" id="{F84B15DE-7C63-A055-5E4A-2BE74259B779}"/>
+              </a:ext>
+            </a:extLst>
+          </p:cNvPr>
+          <p:cNvSpPr>
+            <a:spLocks noGrp="1"/>
+          </p:cNvSpPr>
+          <p:nvPr>
+            <p:ph idx="1"/>
+          </p:nvPr>
+        </p:nvSpPr>
+        <p:spPr/>
+        <p:txBody>
+          <a:bodyPr/>
+          <a:lstStyle/>
+          <a:p>
+            <a:r>
+              <a:rPr lang="pt-BR" dirty="0" err="1"/>
+              <a:t>npm</a:t>
+            </a:r>
+            <a:r>
+              <a:rPr lang="pt-BR" dirty="0"/>
+              <a:t> </a:t>
+            </a:r>
+            <a:r>
+              <a:rPr lang="pt-BR" dirty="0" err="1"/>
+              <a:t>install</a:t>
+            </a:r>
+            <a:r>
+              <a:rPr lang="pt-BR" dirty="0"/>
+              <a:t> </a:t>
+            </a:r>
+            <a:r>
+              <a:rPr lang="pt-BR" dirty="0" err="1"/>
+              <a:t>react</a:t>
+            </a:r>
+            <a:r>
+              <a:rPr lang="pt-BR" dirty="0"/>
+              <a:t>-</a:t>
+            </a:r>
+            <a:r>
+              <a:rPr lang="pt-BR" dirty="0" err="1"/>
+              <a:t>router</a:t>
+            </a:r>
+            <a:r>
+              <a:rPr lang="pt-BR"/>
+              <a:t>-dom @types/react-router-dom</a:t>
+            </a:r>
+            <a:endParaRPr lang="pt-BR" dirty="0"/>
+          </a:p>
+        </p:txBody>
+      </p:sp>
+    </p:spTree>
+    <p:extLst>
+      <p:ext uri="{BB962C8B-B14F-4D97-AF65-F5344CB8AC3E}">
+        <p14:creationId xmlns:p14="http://schemas.microsoft.com/office/powerpoint/2010/main" val="695854263"/>
       </p:ext>
     </p:extLst>
   </p:cSld>

</xml_diff>